<commit_message>
rebuilding site Fri Jan 21 12:25:04 MSK 2022
</commit_message>
<xml_diff>
--- a/files/presentations/Injects_p2.pptx
+++ b/files/presentations/Injects_p2.pptx
@@ -255,7 +255,7 @@
           <a:p>
             <a:fld id="{846CE7D5-CF57-46EF-B807-FDD0502418D4}" type="datetimeFigureOut">
               <a:rPr lang="en-GB" smtClean="0"/>
-              <a:t>20/01/2022</a:t>
+              <a:t>21/01/2022</a:t>
             </a:fld>
             <a:endParaRPr lang="en-GB"/>
           </a:p>
@@ -420,7 +420,7 @@
           <a:p>
             <a:fld id="{846CE7D5-CF57-46EF-B807-FDD0502418D4}" type="datetimeFigureOut">
               <a:rPr lang="en-GB" smtClean="0"/>
-              <a:t>20/01/2022</a:t>
+              <a:t>21/01/2022</a:t>
             </a:fld>
             <a:endParaRPr lang="en-GB"/>
           </a:p>
@@ -595,7 +595,7 @@
           <a:p>
             <a:fld id="{846CE7D5-CF57-46EF-B807-FDD0502418D4}" type="datetimeFigureOut">
               <a:rPr lang="en-GB" smtClean="0"/>
-              <a:t>20/01/2022</a:t>
+              <a:t>21/01/2022</a:t>
             </a:fld>
             <a:endParaRPr lang="en-GB"/>
           </a:p>
@@ -760,7 +760,7 @@
           <a:p>
             <a:fld id="{846CE7D5-CF57-46EF-B807-FDD0502418D4}" type="datetimeFigureOut">
               <a:rPr lang="en-GB" smtClean="0"/>
-              <a:t>20/01/2022</a:t>
+              <a:t>21/01/2022</a:t>
             </a:fld>
             <a:endParaRPr lang="en-GB"/>
           </a:p>
@@ -1001,7 +1001,7 @@
           <a:p>
             <a:fld id="{846CE7D5-CF57-46EF-B807-FDD0502418D4}" type="datetimeFigureOut">
               <a:rPr lang="en-GB" smtClean="0"/>
-              <a:t>20/01/2022</a:t>
+              <a:t>21/01/2022</a:t>
             </a:fld>
             <a:endParaRPr lang="en-GB"/>
           </a:p>
@@ -1228,7 +1228,7 @@
           <a:p>
             <a:fld id="{846CE7D5-CF57-46EF-B807-FDD0502418D4}" type="datetimeFigureOut">
               <a:rPr lang="en-GB" smtClean="0"/>
-              <a:t>20/01/2022</a:t>
+              <a:t>21/01/2022</a:t>
             </a:fld>
             <a:endParaRPr lang="en-GB"/>
           </a:p>
@@ -1590,7 +1590,7 @@
           <a:p>
             <a:fld id="{846CE7D5-CF57-46EF-B807-FDD0502418D4}" type="datetimeFigureOut">
               <a:rPr lang="en-GB" smtClean="0"/>
-              <a:t>20/01/2022</a:t>
+              <a:t>21/01/2022</a:t>
             </a:fld>
             <a:endParaRPr lang="en-GB"/>
           </a:p>
@@ -1703,7 +1703,7 @@
           <a:p>
             <a:fld id="{846CE7D5-CF57-46EF-B807-FDD0502418D4}" type="datetimeFigureOut">
               <a:rPr lang="en-GB" smtClean="0"/>
-              <a:t>20/01/2022</a:t>
+              <a:t>21/01/2022</a:t>
             </a:fld>
             <a:endParaRPr lang="en-GB"/>
           </a:p>
@@ -1793,7 +1793,7 @@
           <a:p>
             <a:fld id="{846CE7D5-CF57-46EF-B807-FDD0502418D4}" type="datetimeFigureOut">
               <a:rPr lang="en-GB" smtClean="0"/>
-              <a:t>20/01/2022</a:t>
+              <a:t>21/01/2022</a:t>
             </a:fld>
             <a:endParaRPr lang="en-GB"/>
           </a:p>
@@ -2065,7 +2065,7 @@
           <a:p>
             <a:fld id="{846CE7D5-CF57-46EF-B807-FDD0502418D4}" type="datetimeFigureOut">
               <a:rPr lang="en-GB" smtClean="0"/>
-              <a:t>20/01/2022</a:t>
+              <a:t>21/01/2022</a:t>
             </a:fld>
             <a:endParaRPr lang="en-GB"/>
           </a:p>
@@ -2317,7 +2317,7 @@
           <a:p>
             <a:fld id="{846CE7D5-CF57-46EF-B807-FDD0502418D4}" type="datetimeFigureOut">
               <a:rPr lang="en-GB" smtClean="0"/>
-              <a:t>20/01/2022</a:t>
+              <a:t>21/01/2022</a:t>
             </a:fld>
             <a:endParaRPr lang="en-GB"/>
           </a:p>
@@ -2525,7 +2525,7 @@
           <a:p>
             <a:fld id="{846CE7D5-CF57-46EF-B807-FDD0502418D4}" type="datetimeFigureOut">
               <a:rPr lang="en-GB" smtClean="0"/>
-              <a:t>20/01/2022</a:t>
+              <a:t>21/01/2022</a:t>
             </a:fld>
             <a:endParaRPr lang="en-GB"/>
           </a:p>
@@ -13797,7 +13797,7 @@
               <a:gd name="connsiteX1" fmla="*/ 217932 w 435864"/>
               <a:gd name="connsiteY1" fmla="*/ 2221605 h 2257926"/>
               <a:gd name="connsiteX2" fmla="*/ 217932 w 435864"/>
-              <a:gd name="connsiteY2" fmla="*/ 1672318 h 2257926"/>
+              <a:gd name="connsiteY2" fmla="*/ 1693445 h 2257926"/>
               <a:gd name="connsiteX3" fmla="*/ 217932 w 435864"/>
               <a:gd name="connsiteY3" fmla="*/ 1165284 h 2257926"/>
               <a:gd name="connsiteX4" fmla="*/ 0 w 435864"/>
@@ -13805,7 +13805,7 @@
               <a:gd name="connsiteX5" fmla="*/ 217932 w 435864"/>
               <a:gd name="connsiteY5" fmla="*/ 1092642 h 2257926"/>
               <a:gd name="connsiteX6" fmla="*/ 217932 w 435864"/>
-              <a:gd name="connsiteY6" fmla="*/ 543355 h 2257926"/>
+              <a:gd name="connsiteY6" fmla="*/ 596171 h 2257926"/>
               <a:gd name="connsiteX7" fmla="*/ 217932 w 435864"/>
               <a:gd name="connsiteY7" fmla="*/ 36321 h 2257926"/>
               <a:gd name="connsiteX8" fmla="*/ 435864 w 435864"/>
@@ -13910,6 +13910,51 @@
                 <a:close/>
               </a:path>
               <a:path w="435864" h="2257926" fill="none" extrusionOk="0">
+                <a:moveTo>
+                  <a:pt x="435864" y="2257926"/>
+                </a:moveTo>
+                <a:cubicBezTo>
+                  <a:pt x="314817" y="2257887"/>
+                  <a:pt x="218747" y="2242367"/>
+                  <a:pt x="217932" y="2221605"/>
+                </a:cubicBezTo>
+                <a:cubicBezTo>
+                  <a:pt x="203995" y="2048646"/>
+                  <a:pt x="214676" y="1953222"/>
+                  <a:pt x="217932" y="1693445"/>
+                </a:cubicBezTo>
+                <a:cubicBezTo>
+                  <a:pt x="221188" y="1433668"/>
+                  <a:pt x="219175" y="1357861"/>
+                  <a:pt x="217932" y="1165284"/>
+                </a:cubicBezTo>
+                <a:cubicBezTo>
+                  <a:pt x="216819" y="1122125"/>
+                  <a:pt x="135110" y="1138255"/>
+                  <a:pt x="0" y="1128963"/>
+                </a:cubicBezTo>
+                <a:cubicBezTo>
+                  <a:pt x="117578" y="1129574"/>
+                  <a:pt x="216452" y="1117315"/>
+                  <a:pt x="217932" y="1092642"/>
+                </a:cubicBezTo>
+                <a:cubicBezTo>
+                  <a:pt x="214436" y="889402"/>
+                  <a:pt x="234466" y="822056"/>
+                  <a:pt x="217932" y="596171"/>
+                </a:cubicBezTo>
+                <a:cubicBezTo>
+                  <a:pt x="201398" y="370286"/>
+                  <a:pt x="228366" y="290217"/>
+                  <a:pt x="217932" y="36321"/>
+                </a:cubicBezTo>
+                <a:cubicBezTo>
+                  <a:pt x="233535" y="918"/>
+                  <a:pt x="305317" y="5711"/>
+                  <a:pt x="435864" y="0"/>
+                </a:cubicBezTo>
+              </a:path>
+              <a:path w="435864" h="2257926" fill="none" stroke="0" extrusionOk="0">
                 <a:moveTo>
                   <a:pt x="435864" y="2257926"/>
                 </a:moveTo>
@@ -14098,46 +14143,6 @@
           <a:chExt cx="0" cy="0"/>
         </a:xfrm>
       </p:grpSpPr>
-      <p:sp>
-        <p:nvSpPr>
-          <p:cNvPr id="2" name="Title 1"/>
-          <p:cNvSpPr>
-            <a:spLocks noGrp="1"/>
-          </p:cNvSpPr>
-          <p:nvPr>
-            <p:ph type="title"/>
-          </p:nvPr>
-        </p:nvSpPr>
-        <p:spPr/>
-        <p:txBody>
-          <a:bodyPr>
-            <a:normAutofit/>
-          </a:bodyPr>
-          <a:lstStyle/>
-          <a:p>
-            <a:r>
-              <a:rPr lang="en-GB" sz="1600" dirty="0">
-                <a:latin typeface="Inconsolata" pitchFamily="49" charset="77"/>
-                <a:ea typeface="Inconsolata" pitchFamily="49" charset="77"/>
-                <a:cs typeface="Calibri Light" panose="020F0302020204030204"/>
-              </a:rPr>
-              <a:t>APC </a:t>
-            </a:r>
-            <a:r>
-              <a:rPr lang="en-GB" sz="1600" dirty="0" err="1">
-                <a:latin typeface="Inconsolata" pitchFamily="49" charset="77"/>
-                <a:ea typeface="Inconsolata" pitchFamily="49" charset="77"/>
-                <a:cs typeface="Calibri Light" panose="020F0302020204030204"/>
-              </a:rPr>
-              <a:t>инъекция</a:t>
-            </a:r>
-            <a:endParaRPr lang="en-US" sz="1600" dirty="0" err="1">
-              <a:latin typeface="Inconsolata" pitchFamily="49" charset="77"/>
-              <a:ea typeface="Inconsolata" pitchFamily="49" charset="77"/>
-            </a:endParaRPr>
-          </a:p>
-        </p:txBody>
-      </p:sp>
       <p:sp>
         <p:nvSpPr>
           <p:cNvPr id="3" name="TextBox 2"/>
@@ -15242,11 +15247,11 @@
               <a:buNone/>
             </a:pPr>
             <a:r>
-              <a:rPr lang="en-US"/>
+              <a:rPr lang="en-US" dirty="0"/>
               <a:t>Ten Process Injection Techniques: A Technical Survey Of Common And Trending Process Injection Techniques</a:t>
             </a:r>
             <a:r>
-              <a:rPr lang="ru-RU" altLang="en-US"/>
+              <a:rPr lang="ru-RU" altLang="en-US" dirty="0"/>
               <a:t>:</a:t>
             </a:r>
           </a:p>
@@ -15255,8 +15260,36 @@
               <a:buNone/>
             </a:pPr>
             <a:r>
-              <a:rPr lang="ru-RU" altLang="en-US"/>
-              <a:t>https://www.endgame.com/blog/technical-blog/ten-process-injection-techniques-technical-survey-common-and-trending-process</a:t>
+              <a:rPr lang="ru-RU" altLang="en-US" dirty="0" err="1"/>
+              <a:t>https</a:t>
+            </a:r>
+            <a:r>
+              <a:rPr lang="ru-RU" altLang="en-US" dirty="0"/>
+              <a:t>://</a:t>
+            </a:r>
+            <a:r>
+              <a:rPr lang="ru-RU" altLang="en-US" dirty="0" err="1"/>
+              <a:t>www.endgame.com</a:t>
+            </a:r>
+            <a:r>
+              <a:rPr lang="ru-RU" altLang="en-US" dirty="0"/>
+              <a:t>/</a:t>
+            </a:r>
+            <a:r>
+              <a:rPr lang="ru-RU" altLang="en-US" dirty="0" err="1"/>
+              <a:t>blog</a:t>
+            </a:r>
+            <a:r>
+              <a:rPr lang="ru-RU" altLang="en-US" dirty="0"/>
+              <a:t>/</a:t>
+            </a:r>
+            <a:r>
+              <a:rPr lang="ru-RU" altLang="en-US" dirty="0" err="1"/>
+              <a:t>technical-blog</a:t>
+            </a:r>
+            <a:r>
+              <a:rPr lang="ru-RU" altLang="en-US" dirty="0"/>
+              <a:t>/ten-process-injection-techniques-technical-survey-common-and-trending-process</a:t>
             </a:r>
           </a:p>
         </p:txBody>
@@ -20703,11 +20736,11 @@
               <a:gd name="connsiteX1" fmla="*/ 477539 w 955078"/>
               <a:gd name="connsiteY1" fmla="*/ 79587 h 4968991"/>
               <a:gd name="connsiteX2" fmla="*/ 477539 w 955078"/>
-              <a:gd name="connsiteY2" fmla="*/ 660918 h 4968991"/>
+              <a:gd name="connsiteY2" fmla="*/ 684171 h 4968991"/>
               <a:gd name="connsiteX3" fmla="*/ 477539 w 955078"/>
-              <a:gd name="connsiteY3" fmla="*/ 1242248 h 4968991"/>
+              <a:gd name="connsiteY3" fmla="*/ 1218995 h 4968991"/>
               <a:gd name="connsiteX4" fmla="*/ 477539 w 955078"/>
-              <a:gd name="connsiteY4" fmla="*/ 1823579 h 4968991"/>
+              <a:gd name="connsiteY4" fmla="*/ 1777072 h 4968991"/>
               <a:gd name="connsiteX5" fmla="*/ 477539 w 955078"/>
               <a:gd name="connsiteY5" fmla="*/ 2404909 h 4968991"/>
               <a:gd name="connsiteX6" fmla="*/ 955078 w 955078"/>
@@ -20715,11 +20748,11 @@
               <a:gd name="connsiteX7" fmla="*/ 477539 w 955078"/>
               <a:gd name="connsiteY7" fmla="*/ 2564083 h 4968991"/>
               <a:gd name="connsiteX8" fmla="*/ 477539 w 955078"/>
-              <a:gd name="connsiteY8" fmla="*/ 3168666 h 4968991"/>
+              <a:gd name="connsiteY8" fmla="*/ 3145413 h 4968991"/>
               <a:gd name="connsiteX9" fmla="*/ 477539 w 955078"/>
-              <a:gd name="connsiteY9" fmla="*/ 3773250 h 4968991"/>
+              <a:gd name="connsiteY9" fmla="*/ 3726744 h 4968991"/>
               <a:gd name="connsiteX10" fmla="*/ 477539 w 955078"/>
-              <a:gd name="connsiteY10" fmla="*/ 4308074 h 4968991"/>
+              <a:gd name="connsiteY10" fmla="*/ 4354580 h 4968991"/>
               <a:gd name="connsiteX11" fmla="*/ 477539 w 955078"/>
               <a:gd name="connsiteY11" fmla="*/ 4889404 h 4968991"/>
               <a:gd name="connsiteX12" fmla="*/ 0 w 955078"/>
@@ -20876,6 +20909,71 @@
                 <a:close/>
               </a:path>
               <a:path w="955078" h="4968991" fill="none" extrusionOk="0">
+                <a:moveTo>
+                  <a:pt x="0" y="0"/>
+                </a:moveTo>
+                <a:cubicBezTo>
+                  <a:pt x="261868" y="6998"/>
+                  <a:pt x="486750" y="38274"/>
+                  <a:pt x="477539" y="79587"/>
+                </a:cubicBezTo>
+                <a:cubicBezTo>
+                  <a:pt x="480796" y="366197"/>
+                  <a:pt x="483395" y="526610"/>
+                  <a:pt x="477539" y="684171"/>
+                </a:cubicBezTo>
+                <a:cubicBezTo>
+                  <a:pt x="471683" y="841732"/>
+                  <a:pt x="451242" y="1085344"/>
+                  <a:pt x="477539" y="1218995"/>
+                </a:cubicBezTo>
+                <a:cubicBezTo>
+                  <a:pt x="503836" y="1352646"/>
+                  <a:pt x="497253" y="1568616"/>
+                  <a:pt x="477539" y="1777072"/>
+                </a:cubicBezTo>
+                <a:cubicBezTo>
+                  <a:pt x="457825" y="1985528"/>
+                  <a:pt x="499352" y="2244208"/>
+                  <a:pt x="477539" y="2404909"/>
+                </a:cubicBezTo>
+                <a:cubicBezTo>
+                  <a:pt x="450721" y="2475486"/>
+                  <a:pt x="710726" y="2488847"/>
+                  <a:pt x="955078" y="2484496"/>
+                </a:cubicBezTo>
+                <a:cubicBezTo>
+                  <a:pt x="692684" y="2483061"/>
+                  <a:pt x="476486" y="2518247"/>
+                  <a:pt x="477539" y="2564083"/>
+                </a:cubicBezTo>
+                <a:cubicBezTo>
+                  <a:pt x="484856" y="2695810"/>
+                  <a:pt x="456232" y="3018311"/>
+                  <a:pt x="477539" y="3145413"/>
+                </a:cubicBezTo>
+                <a:cubicBezTo>
+                  <a:pt x="498847" y="3272515"/>
+                  <a:pt x="479932" y="3580959"/>
+                  <a:pt x="477539" y="3726744"/>
+                </a:cubicBezTo>
+                <a:cubicBezTo>
+                  <a:pt x="475146" y="3872529"/>
+                  <a:pt x="460241" y="4217383"/>
+                  <a:pt x="477539" y="4354580"/>
+                </a:cubicBezTo>
+                <a:cubicBezTo>
+                  <a:pt x="494837" y="4491777"/>
+                  <a:pt x="468749" y="4653585"/>
+                  <a:pt x="477539" y="4889404"/>
+                </a:cubicBezTo>
+                <a:cubicBezTo>
+                  <a:pt x="476024" y="4881294"/>
+                  <a:pt x="264929" y="4956956"/>
+                  <a:pt x="0" y="4968991"/>
+                </a:cubicBezTo>
+              </a:path>
+              <a:path w="955078" h="4968991" fill="none" stroke="0" extrusionOk="0">
                 <a:moveTo>
                   <a:pt x="0" y="0"/>
                 </a:moveTo>

</xml_diff>